<commit_message>
sumwatersheddiversion function makes cursor wait
</commit_message>
<xml_diff>
--- a/presentation.pptx
+++ b/presentation.pptx
@@ -195,7 +195,7 @@
           <a:p>
             <a:fld id="{1213FEF7-411A-9D48-AB8C-F039596F4CE2}" type="datetimeFigureOut">
               <a:rPr lang="en-US" smtClean="0"/>
-              <a:t>12/3/16</a:t>
+              <a:t>12/5/16</a:t>
             </a:fld>
             <a:endParaRPr lang="en-US"/>
           </a:p>
@@ -839,7 +839,7 @@
           <a:p>
             <a:fld id="{6BFECD78-3C8E-49F2-8FAB-59489D168ABB}" type="datetimeFigureOut">
               <a:rPr lang="en-US" smtClean="0"/>
-              <a:t>12/3/16</a:t>
+              <a:t>12/5/16</a:t>
             </a:fld>
             <a:endParaRPr lang="en-US"/>
           </a:p>
@@ -1009,7 +1009,7 @@
           <a:p>
             <a:fld id="{6BFECD78-3C8E-49F2-8FAB-59489D168ABB}" type="datetimeFigureOut">
               <a:rPr lang="en-US" smtClean="0"/>
-              <a:t>12/3/16</a:t>
+              <a:t>12/5/16</a:t>
             </a:fld>
             <a:endParaRPr lang="en-US"/>
           </a:p>
@@ -1189,7 +1189,7 @@
           <a:p>
             <a:fld id="{6BFECD78-3C8E-49F2-8FAB-59489D168ABB}" type="datetimeFigureOut">
               <a:rPr lang="en-US" smtClean="0"/>
-              <a:t>12/3/16</a:t>
+              <a:t>12/5/16</a:t>
             </a:fld>
             <a:endParaRPr lang="en-US"/>
           </a:p>
@@ -1359,7 +1359,7 @@
           <a:p>
             <a:fld id="{6BFECD78-3C8E-49F2-8FAB-59489D168ABB}" type="datetimeFigureOut">
               <a:rPr lang="en-US" smtClean="0"/>
-              <a:t>12/3/16</a:t>
+              <a:t>12/5/16</a:t>
             </a:fld>
             <a:endParaRPr lang="en-US"/>
           </a:p>
@@ -1605,7 +1605,7 @@
           <a:p>
             <a:fld id="{6BFECD78-3C8E-49F2-8FAB-59489D168ABB}" type="datetimeFigureOut">
               <a:rPr lang="en-US" smtClean="0"/>
-              <a:t>12/3/16</a:t>
+              <a:t>12/5/16</a:t>
             </a:fld>
             <a:endParaRPr lang="en-US"/>
           </a:p>
@@ -1893,7 +1893,7 @@
           <a:p>
             <a:fld id="{6BFECD78-3C8E-49F2-8FAB-59489D168ABB}" type="datetimeFigureOut">
               <a:rPr lang="en-US" smtClean="0"/>
-              <a:t>12/3/16</a:t>
+              <a:t>12/5/16</a:t>
             </a:fld>
             <a:endParaRPr lang="en-US"/>
           </a:p>
@@ -2315,7 +2315,7 @@
           <a:p>
             <a:fld id="{6BFECD78-3C8E-49F2-8FAB-59489D168ABB}" type="datetimeFigureOut">
               <a:rPr lang="en-US" smtClean="0"/>
-              <a:t>12/3/16</a:t>
+              <a:t>12/5/16</a:t>
             </a:fld>
             <a:endParaRPr lang="en-US"/>
           </a:p>
@@ -2433,7 +2433,7 @@
           <a:p>
             <a:fld id="{6BFECD78-3C8E-49F2-8FAB-59489D168ABB}" type="datetimeFigureOut">
               <a:rPr lang="en-US" smtClean="0"/>
-              <a:t>12/3/16</a:t>
+              <a:t>12/5/16</a:t>
             </a:fld>
             <a:endParaRPr lang="en-US"/>
           </a:p>
@@ -2528,7 +2528,7 @@
           <a:p>
             <a:fld id="{6BFECD78-3C8E-49F2-8FAB-59489D168ABB}" type="datetimeFigureOut">
               <a:rPr lang="en-US" smtClean="0"/>
-              <a:t>12/3/16</a:t>
+              <a:t>12/5/16</a:t>
             </a:fld>
             <a:endParaRPr lang="en-US"/>
           </a:p>
@@ -2805,7 +2805,7 @@
           <a:p>
             <a:fld id="{6BFECD78-3C8E-49F2-8FAB-59489D168ABB}" type="datetimeFigureOut">
               <a:rPr lang="en-US" smtClean="0"/>
-              <a:t>12/3/16</a:t>
+              <a:t>12/5/16</a:t>
             </a:fld>
             <a:endParaRPr lang="en-US"/>
           </a:p>
@@ -3058,7 +3058,7 @@
           <a:p>
             <a:fld id="{6BFECD78-3C8E-49F2-8FAB-59489D168ABB}" type="datetimeFigureOut">
               <a:rPr lang="en-US" smtClean="0"/>
-              <a:t>12/3/16</a:t>
+              <a:t>12/5/16</a:t>
             </a:fld>
             <a:endParaRPr lang="en-US"/>
           </a:p>
@@ -3271,7 +3271,7 @@
           <a:p>
             <a:fld id="{6BFECD78-3C8E-49F2-8FAB-59489D168ABB}" type="datetimeFigureOut">
               <a:rPr lang="en-US" smtClean="0"/>
-              <a:t>12/3/16</a:t>
+              <a:t>12/5/16</a:t>
             </a:fld>
             <a:endParaRPr lang="en-US"/>
           </a:p>
@@ -4755,8 +4755,23 @@
             </a:r>
             <a:r>
               <a:rPr lang="en-US" dirty="0" smtClean="0"/>
-              <a:t> feature service</a:t>
-            </a:r>
+              <a:t> feature </a:t>
+            </a:r>
+            <a:r>
+              <a:rPr lang="en-US" dirty="0" smtClean="0"/>
+              <a:t>service </a:t>
+            </a:r>
+          </a:p>
+          <a:p>
+            <a:r>
+              <a:rPr lang="en-US" dirty="0" smtClean="0"/>
+              <a:t>Make diversion points snap to </a:t>
+            </a:r>
+            <a:r>
+              <a:rPr lang="en-US" dirty="0" err="1" smtClean="0"/>
+              <a:t>flowline</a:t>
+            </a:r>
+            <a:endParaRPr lang="en-US" dirty="0" smtClean="0"/>
           </a:p>
           <a:p>
             <a:r>

</xml_diff>